<commit_message>
mos GT, probabilites and noise mos_data_10_03
</commit_message>
<xml_diff>
--- a/+Validation/Metrics.pptx
+++ b/+Validation/Metrics.pptx
@@ -13,6 +13,8 @@
     <p:sldId id="263" r:id="rId7"/>
     <p:sldId id="264" r:id="rId8"/>
     <p:sldId id="265" r:id="rId9"/>
+    <p:sldId id="266" r:id="rId10"/>
+    <p:sldId id="267" r:id="rId11"/>
   </p:sldIdLst>
   <p:sldSz cx="12192000" cy="6858000"/>
   <p:notesSz cx="6858000" cy="9144000"/>
@@ -250,7 +252,7 @@
           <a:p>
             <a:fld id="{A12CDB78-3F11-4D29-ADF7-4DC63FE2217A}" type="datetimeFigureOut">
               <a:rPr lang="en-US" smtClean="0"/>
-              <a:t>25/07/2018</a:t>
+              <a:t>10/10/2018</a:t>
             </a:fld>
             <a:endParaRPr lang="en-US"/>
           </a:p>
@@ -420,7 +422,7 @@
           <a:p>
             <a:fld id="{A12CDB78-3F11-4D29-ADF7-4DC63FE2217A}" type="datetimeFigureOut">
               <a:rPr lang="en-US" smtClean="0"/>
-              <a:t>25/07/2018</a:t>
+              <a:t>10/10/2018</a:t>
             </a:fld>
             <a:endParaRPr lang="en-US"/>
           </a:p>
@@ -600,7 +602,7 @@
           <a:p>
             <a:fld id="{A12CDB78-3F11-4D29-ADF7-4DC63FE2217A}" type="datetimeFigureOut">
               <a:rPr lang="en-US" smtClean="0"/>
-              <a:t>25/07/2018</a:t>
+              <a:t>10/10/2018</a:t>
             </a:fld>
             <a:endParaRPr lang="en-US"/>
           </a:p>
@@ -770,7 +772,7 @@
           <a:p>
             <a:fld id="{A12CDB78-3F11-4D29-ADF7-4DC63FE2217A}" type="datetimeFigureOut">
               <a:rPr lang="en-US" smtClean="0"/>
-              <a:t>25/07/2018</a:t>
+              <a:t>10/10/2018</a:t>
             </a:fld>
             <a:endParaRPr lang="en-US"/>
           </a:p>
@@ -1016,7 +1018,7 @@
           <a:p>
             <a:fld id="{A12CDB78-3F11-4D29-ADF7-4DC63FE2217A}" type="datetimeFigureOut">
               <a:rPr lang="en-US" smtClean="0"/>
-              <a:t>25/07/2018</a:t>
+              <a:t>10/10/2018</a:t>
             </a:fld>
             <a:endParaRPr lang="en-US"/>
           </a:p>
@@ -1248,7 +1250,7 @@
           <a:p>
             <a:fld id="{A12CDB78-3F11-4D29-ADF7-4DC63FE2217A}" type="datetimeFigureOut">
               <a:rPr lang="en-US" smtClean="0"/>
-              <a:t>25/07/2018</a:t>
+              <a:t>10/10/2018</a:t>
             </a:fld>
             <a:endParaRPr lang="en-US"/>
           </a:p>
@@ -1615,7 +1617,7 @@
           <a:p>
             <a:fld id="{A12CDB78-3F11-4D29-ADF7-4DC63FE2217A}" type="datetimeFigureOut">
               <a:rPr lang="en-US" smtClean="0"/>
-              <a:t>25/07/2018</a:t>
+              <a:t>10/10/2018</a:t>
             </a:fld>
             <a:endParaRPr lang="en-US"/>
           </a:p>
@@ -1733,7 +1735,7 @@
           <a:p>
             <a:fld id="{A12CDB78-3F11-4D29-ADF7-4DC63FE2217A}" type="datetimeFigureOut">
               <a:rPr lang="en-US" smtClean="0"/>
-              <a:t>25/07/2018</a:t>
+              <a:t>10/10/2018</a:t>
             </a:fld>
             <a:endParaRPr lang="en-US"/>
           </a:p>
@@ -1828,7 +1830,7 @@
           <a:p>
             <a:fld id="{A12CDB78-3F11-4D29-ADF7-4DC63FE2217A}" type="datetimeFigureOut">
               <a:rPr lang="en-US" smtClean="0"/>
-              <a:t>25/07/2018</a:t>
+              <a:t>10/10/2018</a:t>
             </a:fld>
             <a:endParaRPr lang="en-US"/>
           </a:p>
@@ -2105,7 +2107,7 @@
           <a:p>
             <a:fld id="{A12CDB78-3F11-4D29-ADF7-4DC63FE2217A}" type="datetimeFigureOut">
               <a:rPr lang="en-US" smtClean="0"/>
-              <a:t>25/07/2018</a:t>
+              <a:t>10/10/2018</a:t>
             </a:fld>
             <a:endParaRPr lang="en-US"/>
           </a:p>
@@ -2358,7 +2360,7 @@
           <a:p>
             <a:fld id="{A12CDB78-3F11-4D29-ADF7-4DC63FE2217A}" type="datetimeFigureOut">
               <a:rPr lang="en-US" smtClean="0"/>
-              <a:t>25/07/2018</a:t>
+              <a:t>10/10/2018</a:t>
             </a:fld>
             <a:endParaRPr lang="en-US"/>
           </a:p>
@@ -2571,7 +2573,7 @@
           <a:p>
             <a:fld id="{A12CDB78-3F11-4D29-ADF7-4DC63FE2217A}" type="datetimeFigureOut">
               <a:rPr lang="en-US" smtClean="0"/>
-              <a:t>25/07/2018</a:t>
+              <a:t>10/10/2018</a:t>
             </a:fld>
             <a:endParaRPr lang="en-US"/>
           </a:p>
@@ -3042,6 +3044,369 @@
 </p:sld>
 </file>
 
+<file path=ppt/slides/slide10.xml><?xml version="1.0" encoding="utf-8"?>
+<p:sld xmlns:a="http://schemas.openxmlformats.org/drawingml/2006/main" xmlns:r="http://schemas.openxmlformats.org/officeDocument/2006/relationships" xmlns:p="http://schemas.openxmlformats.org/presentationml/2006/main">
+  <p:cSld>
+    <p:spTree>
+      <p:nvGrpSpPr>
+        <p:cNvPr id="1" name=""/>
+        <p:cNvGrpSpPr/>
+        <p:nvPr/>
+      </p:nvGrpSpPr>
+      <p:grpSpPr>
+        <a:xfrm>
+          <a:off x="0" y="0"/>
+          <a:ext cx="0" cy="0"/>
+          <a:chOff x="0" y="0"/>
+          <a:chExt cx="0" cy="0"/>
+        </a:xfrm>
+      </p:grpSpPr>
+      <p:sp>
+        <p:nvSpPr>
+          <p:cNvPr id="2" name="Title 1"/>
+          <p:cNvSpPr>
+            <a:spLocks noGrp="1"/>
+          </p:cNvSpPr>
+          <p:nvPr>
+            <p:ph type="title"/>
+          </p:nvPr>
+        </p:nvSpPr>
+        <p:spPr>
+          <a:xfrm>
+            <a:off x="838200" y="365125"/>
+            <a:ext cx="10515600" cy="760815"/>
+          </a:xfrm>
+        </p:spPr>
+        <p:txBody>
+          <a:bodyPr/>
+          <a:lstStyle/>
+          <a:p>
+            <a:r>
+              <a:rPr lang="en-US" dirty="0"/>
+              <a:t>Metrics</a:t>
+            </a:r>
+            <a:r>
+              <a:rPr lang="en-US" dirty="0" smtClean="0"/>
+              <a:t>: MOS (2)</a:t>
+            </a:r>
+            <a:endParaRPr lang="en-US" dirty="0"/>
+          </a:p>
+        </p:txBody>
+      </p:sp>
+      <p:sp>
+        <p:nvSpPr>
+          <p:cNvPr id="3" name="Content Placeholder 2"/>
+          <p:cNvSpPr>
+            <a:spLocks noGrp="1"/>
+          </p:cNvSpPr>
+          <p:nvPr>
+            <p:ph idx="1"/>
+          </p:nvPr>
+        </p:nvSpPr>
+        <p:spPr>
+          <a:xfrm>
+            <a:off x="838200" y="1125940"/>
+            <a:ext cx="10515600" cy="5051023"/>
+          </a:xfrm>
+        </p:spPr>
+        <p:txBody>
+          <a:bodyPr/>
+          <a:lstStyle/>
+          <a:p>
+            <a:r>
+              <a:rPr lang="en-US" dirty="0" smtClean="0"/>
+              <a:t>MOS: Minimal Object Si</a:t>
+            </a:r>
+            <a:endParaRPr lang="en-US" dirty="0" smtClean="0"/>
+          </a:p>
+          <a:p>
+            <a:endParaRPr lang="en-US" dirty="0"/>
+          </a:p>
+        </p:txBody>
+      </p:sp>
+      <p:sp>
+        <p:nvSpPr>
+          <p:cNvPr id="9" name="TextBox 8"/>
+          <p:cNvSpPr txBox="1"/>
+          <p:nvPr/>
+        </p:nvSpPr>
+        <p:spPr>
+          <a:xfrm>
+            <a:off x="5821137" y="1125940"/>
+            <a:ext cx="6033406" cy="5693866"/>
+          </a:xfrm>
+          <a:prstGeom prst="rect">
+            <a:avLst/>
+          </a:prstGeom>
+          <a:noFill/>
+        </p:spPr>
+        <p:txBody>
+          <a:bodyPr wrap="square" rtlCol="0">
+            <a:spAutoFit/>
+          </a:bodyPr>
+          <a:lstStyle/>
+          <a:p>
+            <a:pPr marL="742950" lvl="1" indent="-285750">
+              <a:buFont typeface="Arial" panose="020B0604020202020204" pitchFamily="34" charset="0"/>
+              <a:buChar char="•"/>
+            </a:pPr>
+            <a:r>
+              <a:rPr lang="en-US" sz="2400" dirty="0"/>
+              <a:t>Find the </a:t>
+            </a:r>
+            <a:r>
+              <a:rPr lang="en-US" sz="2400" dirty="0" smtClean="0"/>
+              <a:t>checkboard</a:t>
+            </a:r>
+          </a:p>
+          <a:p>
+            <a:pPr marL="742950" lvl="1" indent="-285750">
+              <a:buFont typeface="Arial" panose="020B0604020202020204" pitchFamily="34" charset="0"/>
+              <a:buChar char="•"/>
+            </a:pPr>
+            <a:r>
+              <a:rPr lang="en-US" sz="2400" dirty="0" smtClean="0"/>
+              <a:t>Find the width and height of every bar</a:t>
+            </a:r>
+          </a:p>
+          <a:p>
+            <a:pPr marL="742950" lvl="1" indent="-285750">
+              <a:buFont typeface="Arial" panose="020B0604020202020204" pitchFamily="34" charset="0"/>
+              <a:buChar char="•"/>
+            </a:pPr>
+            <a:r>
+              <a:rPr lang="en-US" sz="2400" dirty="0" smtClean="0"/>
+              <a:t>Find the minimal (w.r.t to width/height) distinguishable bar relative to the local noise</a:t>
+            </a:r>
+          </a:p>
+          <a:p>
+            <a:pPr marL="742950" lvl="1" indent="-285750">
+              <a:buFont typeface="Arial" panose="020B0604020202020204" pitchFamily="34" charset="0"/>
+              <a:buChar char="•"/>
+            </a:pPr>
+            <a:r>
+              <a:rPr lang="en-US" sz="2400" dirty="0" smtClean="0"/>
+              <a:t>Currently minimal means </a:t>
+            </a:r>
+            <a:r>
+              <a:rPr lang="en-US" sz="2400" dirty="0" err="1" smtClean="0"/>
+              <a:t>ares</a:t>
+            </a:r>
+            <a:r>
+              <a:rPr lang="en-US" sz="2400" dirty="0" smtClean="0"/>
+              <a:t> of the bar cut: width*height</a:t>
+            </a:r>
+          </a:p>
+          <a:p>
+            <a:pPr marL="742950" lvl="1" indent="-285750">
+              <a:buFont typeface="Arial" panose="020B0604020202020204" pitchFamily="34" charset="0"/>
+              <a:buChar char="•"/>
+            </a:pPr>
+            <a:endParaRPr lang="en-US" sz="2400" dirty="0"/>
+          </a:p>
+          <a:p>
+            <a:r>
+              <a:rPr lang="en-US" sz="2000" dirty="0" smtClean="0"/>
+              <a:t>   	</a:t>
+            </a:r>
+            <a:r>
+              <a:rPr lang="en-US" sz="1600" dirty="0">
+                <a:latin typeface="Consolas" panose="020B0609020204030204" pitchFamily="49" charset="0"/>
+              </a:rPr>
+              <a:t>score </a:t>
+            </a:r>
+            <a:r>
+              <a:rPr lang="en-US" sz="1600" dirty="0">
+                <a:latin typeface="Consolas" panose="020B0609020204030204" pitchFamily="49" charset="0"/>
+              </a:rPr>
+              <a:t>=</a:t>
+            </a:r>
+          </a:p>
+          <a:p>
+            <a:r>
+              <a:rPr lang="en-US" sz="1600" dirty="0">
+                <a:latin typeface="Consolas" panose="020B0609020204030204" pitchFamily="49" charset="0"/>
+              </a:rPr>
+              <a:t>	    </a:t>
+            </a:r>
+            <a:r>
+              <a:rPr lang="en-US" sz="1600" dirty="0">
+                <a:latin typeface="Consolas" panose="020B0609020204030204" pitchFamily="49" charset="0"/>
+              </a:rPr>
+              <a:t>2.1709</a:t>
+            </a:r>
+          </a:p>
+          <a:p>
+            <a:r>
+              <a:rPr lang="en-US" sz="1600" dirty="0">
+                <a:latin typeface="Consolas" panose="020B0609020204030204" pitchFamily="49" charset="0"/>
+              </a:rPr>
+              <a:t>	res </a:t>
+            </a:r>
+            <a:r>
+              <a:rPr lang="en-US" sz="1600" dirty="0">
+                <a:latin typeface="Consolas" panose="020B0609020204030204" pitchFamily="49" charset="0"/>
+              </a:rPr>
+              <a:t>= </a:t>
+            </a:r>
+          </a:p>
+          <a:p>
+            <a:pPr lvl="1"/>
+            <a:r>
+              <a:rPr lang="en-US" sz="1600" dirty="0" smtClean="0">
+                <a:latin typeface="Consolas" panose="020B0609020204030204" pitchFamily="49" charset="0"/>
+              </a:rPr>
+              <a:t> 	 </a:t>
+            </a:r>
+            <a:r>
+              <a:rPr lang="en-US" sz="1600" dirty="0" err="1" smtClean="0">
+                <a:latin typeface="Consolas" panose="020B0609020204030204" pitchFamily="49" charset="0"/>
+              </a:rPr>
+              <a:t>gridSize</a:t>
+            </a:r>
+            <a:r>
+              <a:rPr lang="en-US" sz="1600" dirty="0">
+                <a:latin typeface="Consolas" panose="020B0609020204030204" pitchFamily="49" charset="0"/>
+              </a:rPr>
+              <a:t>: [7 7]</a:t>
+            </a:r>
+          </a:p>
+          <a:p>
+            <a:pPr lvl="1"/>
+            <a:r>
+              <a:rPr lang="en-US" sz="1600" dirty="0">
+                <a:latin typeface="Consolas" panose="020B0609020204030204" pitchFamily="49" charset="0"/>
+              </a:rPr>
+              <a:t>    </a:t>
+            </a:r>
+            <a:r>
+              <a:rPr lang="en-US" sz="1600" dirty="0" smtClean="0">
+                <a:latin typeface="Consolas" panose="020B0609020204030204" pitchFamily="49" charset="0"/>
+              </a:rPr>
+              <a:t>   points</a:t>
+            </a:r>
+            <a:r>
+              <a:rPr lang="en-US" sz="1600" dirty="0">
+                <a:latin typeface="Consolas" panose="020B0609020204030204" pitchFamily="49" charset="0"/>
+              </a:rPr>
+              <a:t>: [49×2 double]</a:t>
+            </a:r>
+          </a:p>
+          <a:p>
+            <a:pPr lvl="1"/>
+            <a:r>
+              <a:rPr lang="en-US" sz="1600" dirty="0" smtClean="0">
+                <a:latin typeface="Consolas" panose="020B0609020204030204" pitchFamily="49" charset="0"/>
+              </a:rPr>
+              <a:t>    </a:t>
+            </a:r>
+            <a:r>
+              <a:rPr lang="en-US" sz="1600" dirty="0">
+                <a:latin typeface="Consolas" panose="020B0609020204030204" pitchFamily="49" charset="0"/>
+              </a:rPr>
+              <a:t>	</a:t>
+            </a:r>
+            <a:r>
+              <a:rPr lang="en-US" sz="1600" dirty="0" smtClean="0">
+                <a:latin typeface="Consolas" panose="020B0609020204030204" pitchFamily="49" charset="0"/>
+              </a:rPr>
+              <a:t>  </a:t>
+            </a:r>
+            <a:r>
+              <a:rPr lang="en-US" sz="1600" dirty="0" err="1" smtClean="0">
+                <a:latin typeface="Consolas" panose="020B0609020204030204" pitchFamily="49" charset="0"/>
+              </a:rPr>
+              <a:t>minArea</a:t>
+            </a:r>
+            <a:r>
+              <a:rPr lang="en-US" sz="1600" dirty="0">
+                <a:latin typeface="Consolas" panose="020B0609020204030204" pitchFamily="49" charset="0"/>
+              </a:rPr>
+              <a:t>: 20.9962</a:t>
+            </a:r>
+          </a:p>
+          <a:p>
+            <a:pPr lvl="1"/>
+            <a:r>
+              <a:rPr lang="en-US" sz="1600" dirty="0" err="1" smtClean="0">
+                <a:latin typeface="Consolas" panose="020B0609020204030204" pitchFamily="49" charset="0"/>
+              </a:rPr>
+              <a:t>meanBlobNoise</a:t>
+            </a:r>
+            <a:r>
+              <a:rPr lang="en-US" sz="1600" dirty="0">
+                <a:latin typeface="Consolas" panose="020B0609020204030204" pitchFamily="49" charset="0"/>
+              </a:rPr>
+              <a:t>: 4.0524</a:t>
+            </a:r>
+          </a:p>
+          <a:p>
+            <a:pPr lvl="1"/>
+            <a:r>
+              <a:rPr lang="en-US" sz="1600" dirty="0" smtClean="0">
+                <a:latin typeface="Consolas" panose="020B0609020204030204" pitchFamily="49" charset="0"/>
+              </a:rPr>
+              <a:t>        </a:t>
+            </a:r>
+            <a:r>
+              <a:rPr lang="en-US" sz="1600" dirty="0">
+                <a:latin typeface="Consolas" panose="020B0609020204030204" pitchFamily="49" charset="0"/>
+              </a:rPr>
+              <a:t>score: '</a:t>
+            </a:r>
+            <a:r>
+              <a:rPr lang="en-US" sz="1600" dirty="0" err="1">
+                <a:latin typeface="Consolas" panose="020B0609020204030204" pitchFamily="49" charset="0"/>
+              </a:rPr>
+              <a:t>minArea</a:t>
+            </a:r>
+            <a:r>
+              <a:rPr lang="en-US" sz="1600" dirty="0">
+                <a:latin typeface="Consolas" panose="020B0609020204030204" pitchFamily="49" charset="0"/>
+              </a:rPr>
+              <a:t>'</a:t>
+            </a:r>
+          </a:p>
+          <a:p>
+            <a:pPr lvl="1"/>
+            <a:r>
+              <a:rPr lang="en-US" sz="1600" dirty="0" smtClean="0">
+                <a:latin typeface="Consolas" panose="020B0609020204030204" pitchFamily="49" charset="0"/>
+              </a:rPr>
+              <a:t>        </a:t>
+            </a:r>
+            <a:r>
+              <a:rPr lang="en-US" sz="1600" dirty="0">
+                <a:latin typeface="Consolas" panose="020B0609020204030204" pitchFamily="49" charset="0"/>
+              </a:rPr>
+              <a:t>units: 'mm^2'</a:t>
+            </a:r>
+            <a:endParaRPr lang="en-US" sz="1600" dirty="0">
+              <a:latin typeface="Consolas" panose="020B0609020204030204" pitchFamily="49" charset="0"/>
+            </a:endParaRPr>
+          </a:p>
+          <a:p>
+            <a:pPr marL="742950" lvl="1" indent="-285750">
+              <a:buFont typeface="Arial" panose="020B0604020202020204" pitchFamily="34" charset="0"/>
+              <a:buChar char="•"/>
+            </a:pPr>
+            <a:endParaRPr lang="en-US" sz="2400" dirty="0"/>
+          </a:p>
+        </p:txBody>
+      </p:sp>
+    </p:spTree>
+    <p:extLst>
+      <p:ext uri="{BB962C8B-B14F-4D97-AF65-F5344CB8AC3E}">
+        <p14:creationId xmlns:p14="http://schemas.microsoft.com/office/powerpoint/2010/main" val="1682889735"/>
+      </p:ext>
+    </p:extLst>
+  </p:cSld>
+  <p:clrMapOvr>
+    <a:masterClrMapping/>
+  </p:clrMapOvr>
+</p:sld>
+</file>
+
 <file path=ppt/slides/slide2.xml><?xml version="1.0" encoding="utf-8"?>
 <p:sld xmlns:a="http://schemas.openxmlformats.org/drawingml/2006/main" xmlns:r="http://schemas.openxmlformats.org/officeDocument/2006/relationships" xmlns:p="http://schemas.openxmlformats.org/presentationml/2006/main">
   <p:cSld>
@@ -4093,11 +4458,7 @@
           <a:p>
             <a:r>
               <a:rPr lang="en-US" dirty="0" smtClean="0"/>
-              <a:t>Metrics: LOS </a:t>
-            </a:r>
-            <a:r>
-              <a:rPr lang="en-US" dirty="0" smtClean="0"/>
-              <a:t>Grid Drift</a:t>
+              <a:t>Metrics: LOS Grid Drift</a:t>
             </a:r>
             <a:endParaRPr lang="en-US" dirty="0"/>
           </a:p>
@@ -5070,13 +5431,8 @@
           <a:p>
             <a:r>
               <a:rPr lang="en-US" dirty="0" smtClean="0"/>
-              <a:t>Check how </a:t>
-            </a:r>
-            <a:r>
-              <a:rPr lang="en-US" dirty="0" smtClean="0"/>
-              <a:t>far the points of the wall from the fit plane</a:t>
-            </a:r>
-            <a:endParaRPr lang="en-US" dirty="0" smtClean="0"/>
+              <a:t>Check how far the points of the wall from the fit plane</a:t>
+            </a:r>
           </a:p>
           <a:p>
             <a:pPr lvl="1"/>
@@ -5084,7 +5440,6 @@
               <a:rPr lang="en-US" dirty="0" smtClean="0"/>
               <a:t>Fit plane for every frame</a:t>
             </a:r>
-            <a:endParaRPr lang="en-US" dirty="0" smtClean="0"/>
           </a:p>
           <a:p>
             <a:pPr lvl="1"/>
@@ -5092,7 +5447,6 @@
               <a:rPr lang="en-US" dirty="0" smtClean="0"/>
               <a:t>Measure distances (z only) from the plane</a:t>
             </a:r>
-            <a:endParaRPr lang="en-US" dirty="0" smtClean="0"/>
           </a:p>
           <a:p>
             <a:endParaRPr lang="en-US" dirty="0"/>
@@ -5365,11 +5719,7 @@
           <a:p>
             <a:r>
               <a:rPr lang="en-US" dirty="0" smtClean="0"/>
-              <a:t>Check </a:t>
-            </a:r>
-            <a:r>
-              <a:rPr lang="en-US" dirty="0" smtClean="0"/>
-              <a:t>how </a:t>
+              <a:t>Check how </a:t>
             </a:r>
             <a:r>
               <a:rPr lang="en-US" dirty="0"/>
@@ -5379,7 +5729,6 @@
               <a:rPr lang="en-US" dirty="0" smtClean="0"/>
               <a:t>distances between all possible corners in 3D from the real distances</a:t>
             </a:r>
-            <a:endParaRPr lang="en-US" dirty="0" smtClean="0"/>
           </a:p>
           <a:p>
             <a:pPr lvl="1"/>
@@ -5391,7 +5740,6 @@
               <a:rPr lang="en-US" dirty="0" smtClean="0"/>
               <a:t> corners into 3D</a:t>
             </a:r>
-            <a:endParaRPr lang="en-US" dirty="0" smtClean="0"/>
           </a:p>
           <a:p>
             <a:pPr lvl="1"/>
@@ -5399,7 +5747,6 @@
               <a:rPr lang="en-US" dirty="0" smtClean="0"/>
               <a:t>Compare the distances</a:t>
             </a:r>
-            <a:endParaRPr lang="en-US" dirty="0" smtClean="0"/>
           </a:p>
           <a:p>
             <a:endParaRPr lang="en-US" dirty="0"/>
@@ -5673,13 +6020,8 @@
           <a:p>
             <a:r>
               <a:rPr lang="en-US" dirty="0" smtClean="0"/>
-              <a:t>Check </a:t>
-            </a:r>
-            <a:r>
-              <a:rPr lang="en-US" dirty="0" smtClean="0"/>
-              <a:t>how sharp the edges of the grid</a:t>
-            </a:r>
-            <a:endParaRPr lang="en-US" dirty="0" smtClean="0"/>
+              <a:t>Check how sharp the edges of the grid</a:t>
+            </a:r>
           </a:p>
           <a:p>
             <a:pPr lvl="1"/>
@@ -5687,7 +6029,6 @@
               <a:rPr lang="en-US" dirty="0" smtClean="0"/>
               <a:t>Find the checkboard</a:t>
             </a:r>
-            <a:endParaRPr lang="en-US" dirty="0" smtClean="0"/>
           </a:p>
           <a:p>
             <a:pPr lvl="1"/>
@@ -5695,7 +6036,6 @@
               <a:rPr lang="en-US" dirty="0" smtClean="0"/>
               <a:t>Measure the width of the edges</a:t>
             </a:r>
-            <a:endParaRPr lang="en-US" dirty="0" smtClean="0"/>
           </a:p>
           <a:p>
             <a:endParaRPr lang="en-US" dirty="0"/>
@@ -6172,6 +6512,393 @@
     <p:extLst>
       <p:ext uri="{BB962C8B-B14F-4D97-AF65-F5344CB8AC3E}">
         <p14:creationId xmlns:p14="http://schemas.microsoft.com/office/powerpoint/2010/main" val="3950070479"/>
+      </p:ext>
+    </p:extLst>
+  </p:cSld>
+  <p:clrMapOvr>
+    <a:masterClrMapping/>
+  </p:clrMapOvr>
+</p:sld>
+</file>
+
+<file path=ppt/slides/slide9.xml><?xml version="1.0" encoding="utf-8"?>
+<p:sld xmlns:a="http://schemas.openxmlformats.org/drawingml/2006/main" xmlns:r="http://schemas.openxmlformats.org/officeDocument/2006/relationships" xmlns:p="http://schemas.openxmlformats.org/presentationml/2006/main">
+  <p:cSld>
+    <p:spTree>
+      <p:nvGrpSpPr>
+        <p:cNvPr id="1" name=""/>
+        <p:cNvGrpSpPr/>
+        <p:nvPr/>
+      </p:nvGrpSpPr>
+      <p:grpSpPr>
+        <a:xfrm>
+          <a:off x="0" y="0"/>
+          <a:ext cx="0" cy="0"/>
+          <a:chOff x="0" y="0"/>
+          <a:chExt cx="0" cy="0"/>
+        </a:xfrm>
+      </p:grpSpPr>
+      <p:sp>
+        <p:nvSpPr>
+          <p:cNvPr id="2" name="Title 1"/>
+          <p:cNvSpPr>
+            <a:spLocks noGrp="1"/>
+          </p:cNvSpPr>
+          <p:nvPr>
+            <p:ph type="title"/>
+          </p:nvPr>
+        </p:nvSpPr>
+        <p:spPr>
+          <a:xfrm>
+            <a:off x="838200" y="365125"/>
+            <a:ext cx="10515600" cy="760815"/>
+          </a:xfrm>
+        </p:spPr>
+        <p:txBody>
+          <a:bodyPr/>
+          <a:lstStyle/>
+          <a:p>
+            <a:r>
+              <a:rPr lang="en-US" dirty="0"/>
+              <a:t>Metrics</a:t>
+            </a:r>
+            <a:r>
+              <a:rPr lang="en-US" dirty="0" smtClean="0"/>
+              <a:t>: MOS (1)</a:t>
+            </a:r>
+            <a:endParaRPr lang="en-US" dirty="0"/>
+          </a:p>
+        </p:txBody>
+      </p:sp>
+      <p:sp>
+        <p:nvSpPr>
+          <p:cNvPr id="3" name="Content Placeholder 2"/>
+          <p:cNvSpPr>
+            <a:spLocks noGrp="1"/>
+          </p:cNvSpPr>
+          <p:nvPr>
+            <p:ph idx="1"/>
+          </p:nvPr>
+        </p:nvSpPr>
+        <p:spPr>
+          <a:xfrm>
+            <a:off x="838200" y="1125940"/>
+            <a:ext cx="10515600" cy="5051023"/>
+          </a:xfrm>
+        </p:spPr>
+        <p:txBody>
+          <a:bodyPr/>
+          <a:lstStyle/>
+          <a:p>
+            <a:r>
+              <a:rPr lang="en-US" dirty="0" smtClean="0"/>
+              <a:t>MOS: Minimal Object Si</a:t>
+            </a:r>
+            <a:endParaRPr lang="en-US" dirty="0" smtClean="0"/>
+          </a:p>
+          <a:p>
+            <a:endParaRPr lang="en-US" dirty="0"/>
+          </a:p>
+        </p:txBody>
+      </p:sp>
+      <p:sp>
+        <p:nvSpPr>
+          <p:cNvPr id="9" name="TextBox 8"/>
+          <p:cNvSpPr txBox="1"/>
+          <p:nvPr/>
+        </p:nvSpPr>
+        <p:spPr>
+          <a:xfrm>
+            <a:off x="5821137" y="1125940"/>
+            <a:ext cx="6033406" cy="5693866"/>
+          </a:xfrm>
+          <a:prstGeom prst="rect">
+            <a:avLst/>
+          </a:prstGeom>
+          <a:noFill/>
+        </p:spPr>
+        <p:txBody>
+          <a:bodyPr wrap="square" rtlCol="0">
+            <a:spAutoFit/>
+          </a:bodyPr>
+          <a:lstStyle/>
+          <a:p>
+            <a:pPr marL="742950" lvl="1" indent="-285750">
+              <a:buFont typeface="Arial" panose="020B0604020202020204" pitchFamily="34" charset="0"/>
+              <a:buChar char="•"/>
+            </a:pPr>
+            <a:r>
+              <a:rPr lang="en-US" sz="2400" dirty="0"/>
+              <a:t>Find the </a:t>
+            </a:r>
+            <a:r>
+              <a:rPr lang="en-US" sz="2400" dirty="0" smtClean="0"/>
+              <a:t>checkboard</a:t>
+            </a:r>
+          </a:p>
+          <a:p>
+            <a:pPr marL="742950" lvl="1" indent="-285750">
+              <a:buFont typeface="Arial" panose="020B0604020202020204" pitchFamily="34" charset="0"/>
+              <a:buChar char="•"/>
+            </a:pPr>
+            <a:r>
+              <a:rPr lang="en-US" sz="2400" dirty="0" smtClean="0"/>
+              <a:t>Find the width and height of every bar</a:t>
+            </a:r>
+          </a:p>
+          <a:p>
+            <a:pPr marL="742950" lvl="1" indent="-285750">
+              <a:buFont typeface="Arial" panose="020B0604020202020204" pitchFamily="34" charset="0"/>
+              <a:buChar char="•"/>
+            </a:pPr>
+            <a:r>
+              <a:rPr lang="en-US" sz="2400" dirty="0" smtClean="0"/>
+              <a:t>Find the minimal (w.r.t to width/height) distinguishable bar relative to the local noise</a:t>
+            </a:r>
+          </a:p>
+          <a:p>
+            <a:pPr marL="742950" lvl="1" indent="-285750">
+              <a:buFont typeface="Arial" panose="020B0604020202020204" pitchFamily="34" charset="0"/>
+              <a:buChar char="•"/>
+            </a:pPr>
+            <a:r>
+              <a:rPr lang="en-US" sz="2400" dirty="0" smtClean="0"/>
+              <a:t>Currently minimal means </a:t>
+            </a:r>
+            <a:r>
+              <a:rPr lang="en-US" sz="2400" dirty="0" err="1" smtClean="0"/>
+              <a:t>ares</a:t>
+            </a:r>
+            <a:r>
+              <a:rPr lang="en-US" sz="2400" dirty="0" smtClean="0"/>
+              <a:t> of the bar cut: width*height</a:t>
+            </a:r>
+          </a:p>
+          <a:p>
+            <a:pPr marL="742950" lvl="1" indent="-285750">
+              <a:buFont typeface="Arial" panose="020B0604020202020204" pitchFamily="34" charset="0"/>
+              <a:buChar char="•"/>
+            </a:pPr>
+            <a:endParaRPr lang="en-US" sz="2400" dirty="0"/>
+          </a:p>
+          <a:p>
+            <a:r>
+              <a:rPr lang="en-US" sz="2000" dirty="0" smtClean="0"/>
+              <a:t>   	</a:t>
+            </a:r>
+            <a:r>
+              <a:rPr lang="en-US" sz="1600" dirty="0">
+                <a:latin typeface="Consolas" panose="020B0609020204030204" pitchFamily="49" charset="0"/>
+              </a:rPr>
+              <a:t>score </a:t>
+            </a:r>
+            <a:r>
+              <a:rPr lang="en-US" sz="1600" dirty="0">
+                <a:latin typeface="Consolas" panose="020B0609020204030204" pitchFamily="49" charset="0"/>
+              </a:rPr>
+              <a:t>=</a:t>
+            </a:r>
+          </a:p>
+          <a:p>
+            <a:r>
+              <a:rPr lang="en-US" sz="1600" dirty="0">
+                <a:latin typeface="Consolas" panose="020B0609020204030204" pitchFamily="49" charset="0"/>
+              </a:rPr>
+              <a:t>	    </a:t>
+            </a:r>
+            <a:r>
+              <a:rPr lang="en-US" sz="1600" dirty="0">
+                <a:latin typeface="Consolas" panose="020B0609020204030204" pitchFamily="49" charset="0"/>
+              </a:rPr>
+              <a:t>2.1709</a:t>
+            </a:r>
+          </a:p>
+          <a:p>
+            <a:r>
+              <a:rPr lang="en-US" sz="1600" dirty="0">
+                <a:latin typeface="Consolas" panose="020B0609020204030204" pitchFamily="49" charset="0"/>
+              </a:rPr>
+              <a:t>	res </a:t>
+            </a:r>
+            <a:r>
+              <a:rPr lang="en-US" sz="1600" dirty="0">
+                <a:latin typeface="Consolas" panose="020B0609020204030204" pitchFamily="49" charset="0"/>
+              </a:rPr>
+              <a:t>= </a:t>
+            </a:r>
+          </a:p>
+          <a:p>
+            <a:pPr lvl="1"/>
+            <a:r>
+              <a:rPr lang="en-US" sz="1600" dirty="0" smtClean="0">
+                <a:latin typeface="Consolas" panose="020B0609020204030204" pitchFamily="49" charset="0"/>
+              </a:rPr>
+              <a:t> 	 </a:t>
+            </a:r>
+            <a:r>
+              <a:rPr lang="en-US" sz="1600" dirty="0" err="1" smtClean="0">
+                <a:latin typeface="Consolas" panose="020B0609020204030204" pitchFamily="49" charset="0"/>
+              </a:rPr>
+              <a:t>gridSize</a:t>
+            </a:r>
+            <a:r>
+              <a:rPr lang="en-US" sz="1600" dirty="0">
+                <a:latin typeface="Consolas" panose="020B0609020204030204" pitchFamily="49" charset="0"/>
+              </a:rPr>
+              <a:t>: [7 7]</a:t>
+            </a:r>
+          </a:p>
+          <a:p>
+            <a:pPr lvl="1"/>
+            <a:r>
+              <a:rPr lang="en-US" sz="1600" dirty="0">
+                <a:latin typeface="Consolas" panose="020B0609020204030204" pitchFamily="49" charset="0"/>
+              </a:rPr>
+              <a:t>    </a:t>
+            </a:r>
+            <a:r>
+              <a:rPr lang="en-US" sz="1600" dirty="0" smtClean="0">
+                <a:latin typeface="Consolas" panose="020B0609020204030204" pitchFamily="49" charset="0"/>
+              </a:rPr>
+              <a:t>   points</a:t>
+            </a:r>
+            <a:r>
+              <a:rPr lang="en-US" sz="1600" dirty="0">
+                <a:latin typeface="Consolas" panose="020B0609020204030204" pitchFamily="49" charset="0"/>
+              </a:rPr>
+              <a:t>: [49×2 double]</a:t>
+            </a:r>
+          </a:p>
+          <a:p>
+            <a:pPr lvl="1"/>
+            <a:r>
+              <a:rPr lang="en-US" sz="1600" dirty="0" smtClean="0">
+                <a:latin typeface="Consolas" panose="020B0609020204030204" pitchFamily="49" charset="0"/>
+              </a:rPr>
+              <a:t>    </a:t>
+            </a:r>
+            <a:r>
+              <a:rPr lang="en-US" sz="1600" dirty="0">
+                <a:latin typeface="Consolas" panose="020B0609020204030204" pitchFamily="49" charset="0"/>
+              </a:rPr>
+              <a:t>	</a:t>
+            </a:r>
+            <a:r>
+              <a:rPr lang="en-US" sz="1600" dirty="0" smtClean="0">
+                <a:latin typeface="Consolas" panose="020B0609020204030204" pitchFamily="49" charset="0"/>
+              </a:rPr>
+              <a:t>  </a:t>
+            </a:r>
+            <a:r>
+              <a:rPr lang="en-US" sz="1600" dirty="0" err="1" smtClean="0">
+                <a:latin typeface="Consolas" panose="020B0609020204030204" pitchFamily="49" charset="0"/>
+              </a:rPr>
+              <a:t>minArea</a:t>
+            </a:r>
+            <a:r>
+              <a:rPr lang="en-US" sz="1600" dirty="0">
+                <a:latin typeface="Consolas" panose="020B0609020204030204" pitchFamily="49" charset="0"/>
+              </a:rPr>
+              <a:t>: 20.9962</a:t>
+            </a:r>
+          </a:p>
+          <a:p>
+            <a:pPr lvl="1"/>
+            <a:r>
+              <a:rPr lang="en-US" sz="1600" dirty="0" err="1" smtClean="0">
+                <a:latin typeface="Consolas" panose="020B0609020204030204" pitchFamily="49" charset="0"/>
+              </a:rPr>
+              <a:t>meanBlobNoise</a:t>
+            </a:r>
+            <a:r>
+              <a:rPr lang="en-US" sz="1600" dirty="0">
+                <a:latin typeface="Consolas" panose="020B0609020204030204" pitchFamily="49" charset="0"/>
+              </a:rPr>
+              <a:t>: 4.0524</a:t>
+            </a:r>
+          </a:p>
+          <a:p>
+            <a:pPr lvl="1"/>
+            <a:r>
+              <a:rPr lang="en-US" sz="1600" dirty="0" smtClean="0">
+                <a:latin typeface="Consolas" panose="020B0609020204030204" pitchFamily="49" charset="0"/>
+              </a:rPr>
+              <a:t>        </a:t>
+            </a:r>
+            <a:r>
+              <a:rPr lang="en-US" sz="1600" dirty="0">
+                <a:latin typeface="Consolas" panose="020B0609020204030204" pitchFamily="49" charset="0"/>
+              </a:rPr>
+              <a:t>score: '</a:t>
+            </a:r>
+            <a:r>
+              <a:rPr lang="en-US" sz="1600" dirty="0" err="1">
+                <a:latin typeface="Consolas" panose="020B0609020204030204" pitchFamily="49" charset="0"/>
+              </a:rPr>
+              <a:t>minArea</a:t>
+            </a:r>
+            <a:r>
+              <a:rPr lang="en-US" sz="1600" dirty="0">
+                <a:latin typeface="Consolas" panose="020B0609020204030204" pitchFamily="49" charset="0"/>
+              </a:rPr>
+              <a:t>'</a:t>
+            </a:r>
+          </a:p>
+          <a:p>
+            <a:pPr lvl="1"/>
+            <a:r>
+              <a:rPr lang="en-US" sz="1600" dirty="0" smtClean="0">
+                <a:latin typeface="Consolas" panose="020B0609020204030204" pitchFamily="49" charset="0"/>
+              </a:rPr>
+              <a:t>        </a:t>
+            </a:r>
+            <a:r>
+              <a:rPr lang="en-US" sz="1600" dirty="0">
+                <a:latin typeface="Consolas" panose="020B0609020204030204" pitchFamily="49" charset="0"/>
+              </a:rPr>
+              <a:t>units: 'mm^2'</a:t>
+            </a:r>
+            <a:endParaRPr lang="en-US" sz="1600" dirty="0">
+              <a:latin typeface="Consolas" panose="020B0609020204030204" pitchFamily="49" charset="0"/>
+            </a:endParaRPr>
+          </a:p>
+          <a:p>
+            <a:pPr marL="742950" lvl="1" indent="-285750">
+              <a:buFont typeface="Arial" panose="020B0604020202020204" pitchFamily="34" charset="0"/>
+              <a:buChar char="•"/>
+            </a:pPr>
+            <a:endParaRPr lang="en-US" sz="2400" dirty="0"/>
+          </a:p>
+        </p:txBody>
+      </p:sp>
+      <p:pic>
+        <p:nvPicPr>
+          <p:cNvPr id="4" name="Picture 3"/>
+          <p:cNvPicPr>
+            <a:picLocks noChangeAspect="1"/>
+          </p:cNvPicPr>
+          <p:nvPr/>
+        </p:nvPicPr>
+        <p:blipFill>
+          <a:blip r:embed="rId2"/>
+          <a:stretch>
+            <a:fillRect/>
+          </a:stretch>
+        </p:blipFill>
+        <p:spPr>
+          <a:xfrm>
+            <a:off x="838200" y="1772272"/>
+            <a:ext cx="5307853" cy="4922442"/>
+          </a:xfrm>
+          <a:prstGeom prst="rect">
+            <a:avLst/>
+          </a:prstGeom>
+        </p:spPr>
+      </p:pic>
+    </p:spTree>
+    <p:extLst>
+      <p:ext uri="{BB962C8B-B14F-4D97-AF65-F5344CB8AC3E}">
+        <p14:creationId xmlns:p14="http://schemas.microsoft.com/office/powerpoint/2010/main" val="1465494036"/>
       </p:ext>
     </p:extLst>
   </p:cSld>

</xml_diff>